<commit_message>
Github link added to presentation
</commit_message>
<xml_diff>
--- a/presentation/Tur2Spell.pptx
+++ b/presentation/Tur2Spell.pptx
@@ -15,7 +15,8 @@
     <p:sldId id="263" r:id="rId9"/>
     <p:sldId id="266" r:id="rId10"/>
     <p:sldId id="267" r:id="rId11"/>
-    <p:sldId id="258" r:id="rId12"/>
+    <p:sldId id="268" r:id="rId12"/>
+    <p:sldId id="258" r:id="rId13"/>
   </p:sldIdLst>
   <p:sldSz cx="12192000" cy="6858000"/>
   <p:notesSz cx="6858000" cy="9144000"/>
@@ -4926,6 +4927,945 @@
 <file path=ppt/slides/slide11.xml><?xml version="1.0" encoding="utf-8"?>
 <p:sld xmlns:a="http://schemas.openxmlformats.org/drawingml/2006/main" xmlns:r="http://schemas.openxmlformats.org/officeDocument/2006/relationships" xmlns:p="http://schemas.openxmlformats.org/presentationml/2006/main">
   <p:cSld>
+    <p:bg>
+      <p:bgPr>
+        <a:blipFill rotWithShape="1">
+          <a:blip r:embed="rId2">
+            <a:duotone>
+              <a:schemeClr val="bg1">
+                <a:tint val="75000"/>
+                <a:shade val="58000"/>
+                <a:satMod val="120000"/>
+              </a:schemeClr>
+              <a:schemeClr val="bg1">
+                <a:tint val="50000"/>
+                <a:shade val="96000"/>
+              </a:schemeClr>
+            </a:duotone>
+            <a:extLst/>
+          </a:blip>
+          <a:tile tx="0" ty="0" sx="100000" sy="100000" flip="none" algn="tl"/>
+        </a:blipFill>
+        <a:effectLst/>
+      </p:bgPr>
+    </p:bg>
+    <p:spTree>
+      <p:nvGrpSpPr>
+        <p:cNvPr id="1" name=""/>
+        <p:cNvGrpSpPr/>
+        <p:nvPr/>
+      </p:nvGrpSpPr>
+      <p:grpSpPr>
+        <a:xfrm>
+          <a:off x="0" y="0"/>
+          <a:ext cx="0" cy="0"/>
+          <a:chOff x="0" y="0"/>
+          <a:chExt cx="0" cy="0"/>
+        </a:xfrm>
+      </p:grpSpPr>
+      <p:sp>
+        <p:nvSpPr>
+          <p:cNvPr id="1028" name="Rectangle 134">
+            <a:extLst>
+              <a:ext uri="{FF2B5EF4-FFF2-40B4-BE49-F238E27FC236}">
+                <a16:creationId xmlns:a16="http://schemas.microsoft.com/office/drawing/2014/main" id="{7049A7D3-684C-4C59-A4B6-7B308A6AD34D}"/>
+              </a:ext>
+              <a:ext uri="{C183D7F6-B498-43B3-948B-1728B52AA6E4}">
+                <adec:decorative xmlns:adec="http://schemas.microsoft.com/office/drawing/2017/decorative" val="1"/>
+              </a:ext>
+            </a:extLst>
+          </p:cNvPr>
+          <p:cNvSpPr>
+            <a:spLocks noGrp="1" noRot="1" noChangeAspect="1" noMove="1" noResize="1" noEditPoints="1" noAdjustHandles="1" noChangeArrowheads="1" noChangeShapeType="1" noTextEdit="1"/>
+          </p:cNvSpPr>
+          <p:nvPr>
+            <p:extLst>
+              <p:ext uri="{386F3935-93C4-4BCD-93E2-E3B085C9AB24}">
+                <p16:designElem xmlns:p16="http://schemas.microsoft.com/office/powerpoint/2015/main" val="1"/>
+              </p:ext>
+            </p:extLst>
+          </p:nvPr>
+        </p:nvSpPr>
+        <p:spPr>
+          <a:xfrm>
+            <a:off x="920834" y="1346946"/>
+            <a:ext cx="10222992" cy="80683"/>
+          </a:xfrm>
+          <a:prstGeom prst="rect">
+            <a:avLst/>
+          </a:prstGeom>
+          <a:blipFill dpi="0" rotWithShape="1">
+            <a:blip r:embed="rId3">
+              <a:alphaModFix amt="85000"/>
+              <a:lum bright="70000" contrast="-70000"/>
+              <a:extLst>
+                <a:ext uri="{BEBA8EAE-BF5A-486C-A8C5-ECC9F3942E4B}">
+                  <a14:imgProps xmlns:a14="http://schemas.microsoft.com/office/drawing/2010/main">
+                    <a14:imgLayer r:embed="rId4">
+                      <a14:imgEffect>
+                        <a14:sharpenSoften amount="61000"/>
+                      </a14:imgEffect>
+                    </a14:imgLayer>
+                  </a14:imgProps>
+                </a:ext>
+                <a:ext uri="{28A0092B-C50C-407E-A947-70E740481C1C}">
+                  <a14:useLocalDpi xmlns:a14="http://schemas.microsoft.com/office/drawing/2010/main" val="0"/>
+                </a:ext>
+              </a:extLst>
+            </a:blip>
+            <a:srcRect/>
+            <a:tile tx="0" ty="-762000" sx="92000" sy="89000" flip="xy" algn="ctr"/>
+          </a:blipFill>
+          <a:ln>
+            <a:noFill/>
+          </a:ln>
+        </p:spPr>
+        <p:style>
+          <a:lnRef idx="2">
+            <a:schemeClr val="accent1">
+              <a:shade val="50000"/>
+            </a:schemeClr>
+          </a:lnRef>
+          <a:fillRef idx="1">
+            <a:schemeClr val="accent1"/>
+          </a:fillRef>
+          <a:effectRef idx="0">
+            <a:schemeClr val="accent1"/>
+          </a:effectRef>
+          <a:fontRef idx="minor">
+            <a:schemeClr val="lt1"/>
+          </a:fontRef>
+        </p:style>
+        <p:txBody>
+          <a:bodyPr rtlCol="0" anchor="ctr"/>
+          <a:lstStyle/>
+          <a:p>
+            <a:pPr algn="ctr"/>
+            <a:endParaRPr lang="en-US"/>
+          </a:p>
+        </p:txBody>
+      </p:sp>
+      <p:sp>
+        <p:nvSpPr>
+          <p:cNvPr id="1029" name="Rectangle 136">
+            <a:extLst>
+              <a:ext uri="{FF2B5EF4-FFF2-40B4-BE49-F238E27FC236}">
+                <a16:creationId xmlns:a16="http://schemas.microsoft.com/office/drawing/2014/main" id="{D7B1087B-C592-40E7-B532-60B453A2FE6A}"/>
+              </a:ext>
+              <a:ext uri="{C183D7F6-B498-43B3-948B-1728B52AA6E4}">
+                <adec:decorative xmlns:adec="http://schemas.microsoft.com/office/drawing/2017/decorative" val="1"/>
+              </a:ext>
+            </a:extLst>
+          </p:cNvPr>
+          <p:cNvSpPr>
+            <a:spLocks noGrp="1" noRot="1" noChangeAspect="1" noMove="1" noResize="1" noEditPoints="1" noAdjustHandles="1" noChangeArrowheads="1" noChangeShapeType="1" noTextEdit="1"/>
+          </p:cNvSpPr>
+          <p:nvPr>
+            <p:extLst>
+              <p:ext uri="{386F3935-93C4-4BCD-93E2-E3B085C9AB24}">
+                <p16:designElem xmlns:p16="http://schemas.microsoft.com/office/powerpoint/2015/main" val="1"/>
+              </p:ext>
+            </p:extLst>
+          </p:nvPr>
+        </p:nvSpPr>
+        <p:spPr>
+          <a:xfrm>
+            <a:off x="920834" y="4299696"/>
+            <a:ext cx="10222992" cy="80683"/>
+          </a:xfrm>
+          <a:prstGeom prst="rect">
+            <a:avLst/>
+          </a:prstGeom>
+          <a:blipFill dpi="0" rotWithShape="1">
+            <a:blip r:embed="rId3">
+              <a:alphaModFix amt="85000"/>
+              <a:lum bright="70000" contrast="-70000"/>
+              <a:extLst>
+                <a:ext uri="{BEBA8EAE-BF5A-486C-A8C5-ECC9F3942E4B}">
+                  <a14:imgProps xmlns:a14="http://schemas.microsoft.com/office/drawing/2010/main">
+                    <a14:imgLayer r:embed="rId4">
+                      <a14:imgEffect>
+                        <a14:sharpenSoften amount="61000"/>
+                      </a14:imgEffect>
+                    </a14:imgLayer>
+                  </a14:imgProps>
+                </a:ext>
+                <a:ext uri="{28A0092B-C50C-407E-A947-70E740481C1C}">
+                  <a14:useLocalDpi xmlns:a14="http://schemas.microsoft.com/office/drawing/2010/main" val="0"/>
+                </a:ext>
+              </a:extLst>
+            </a:blip>
+            <a:srcRect/>
+            <a:tile tx="0" ty="-717550" sx="92000" sy="89000" flip="xy" algn="ctr"/>
+          </a:blipFill>
+          <a:ln>
+            <a:noFill/>
+          </a:ln>
+        </p:spPr>
+        <p:style>
+          <a:lnRef idx="2">
+            <a:schemeClr val="accent1">
+              <a:shade val="50000"/>
+            </a:schemeClr>
+          </a:lnRef>
+          <a:fillRef idx="1">
+            <a:schemeClr val="accent1"/>
+          </a:fillRef>
+          <a:effectRef idx="0">
+            <a:schemeClr val="accent1"/>
+          </a:effectRef>
+          <a:fontRef idx="minor">
+            <a:schemeClr val="lt1"/>
+          </a:fontRef>
+        </p:style>
+        <p:txBody>
+          <a:bodyPr rtlCol="0" anchor="ctr"/>
+          <a:lstStyle/>
+          <a:p>
+            <a:pPr algn="ctr"/>
+            <a:endParaRPr lang="en-US"/>
+          </a:p>
+        </p:txBody>
+      </p:sp>
+      <p:sp>
+        <p:nvSpPr>
+          <p:cNvPr id="1030" name="Rectangle 138">
+            <a:extLst>
+              <a:ext uri="{FF2B5EF4-FFF2-40B4-BE49-F238E27FC236}">
+                <a16:creationId xmlns:a16="http://schemas.microsoft.com/office/drawing/2014/main" id="{14AE7447-E8F8-4A0F-9E3D-94842BFF886E}"/>
+              </a:ext>
+              <a:ext uri="{C183D7F6-B498-43B3-948B-1728B52AA6E4}">
+                <adec:decorative xmlns:adec="http://schemas.microsoft.com/office/drawing/2017/decorative" val="1"/>
+              </a:ext>
+            </a:extLst>
+          </p:cNvPr>
+          <p:cNvSpPr>
+            <a:spLocks noGrp="1" noRot="1" noChangeAspect="1" noMove="1" noResize="1" noEditPoints="1" noAdjustHandles="1" noChangeArrowheads="1" noChangeShapeType="1" noTextEdit="1"/>
+          </p:cNvSpPr>
+          <p:nvPr>
+            <p:extLst>
+              <p:ext uri="{386F3935-93C4-4BCD-93E2-E3B085C9AB24}">
+                <p16:designElem xmlns:p16="http://schemas.microsoft.com/office/powerpoint/2015/main" val="1"/>
+              </p:ext>
+            </p:extLst>
+          </p:nvPr>
+        </p:nvSpPr>
+        <p:spPr>
+          <a:xfrm>
+            <a:off x="920834" y="1484779"/>
+            <a:ext cx="10222992" cy="2743200"/>
+          </a:xfrm>
+          <a:prstGeom prst="rect">
+            <a:avLst/>
+          </a:prstGeom>
+          <a:blipFill dpi="0" rotWithShape="1">
+            <a:blip r:embed="rId3">
+              <a:alphaModFix amt="85000"/>
+              <a:lum bright="70000" contrast="-70000"/>
+              <a:extLst>
+                <a:ext uri="{BEBA8EAE-BF5A-486C-A8C5-ECC9F3942E4B}">
+                  <a14:imgProps xmlns:a14="http://schemas.microsoft.com/office/drawing/2010/main">
+                    <a14:imgLayer r:embed="rId4">
+                      <a14:imgEffect>
+                        <a14:sharpenSoften amount="61000"/>
+                      </a14:imgEffect>
+                    </a14:imgLayer>
+                  </a14:imgProps>
+                </a:ext>
+                <a:ext uri="{28A0092B-C50C-407E-A947-70E740481C1C}">
+                  <a14:useLocalDpi xmlns:a14="http://schemas.microsoft.com/office/drawing/2010/main" val="0"/>
+                </a:ext>
+              </a:extLst>
+            </a:blip>
+            <a:srcRect/>
+            <a:tile tx="0" ty="-704850" sx="92000" sy="89000" flip="xy" algn="ctr"/>
+          </a:blipFill>
+          <a:ln>
+            <a:noFill/>
+          </a:ln>
+        </p:spPr>
+        <p:style>
+          <a:lnRef idx="2">
+            <a:schemeClr val="accent1">
+              <a:shade val="50000"/>
+            </a:schemeClr>
+          </a:lnRef>
+          <a:fillRef idx="1">
+            <a:schemeClr val="accent1"/>
+          </a:fillRef>
+          <a:effectRef idx="0">
+            <a:schemeClr val="accent1"/>
+          </a:effectRef>
+          <a:fontRef idx="minor">
+            <a:schemeClr val="lt1"/>
+          </a:fontRef>
+        </p:style>
+        <p:txBody>
+          <a:bodyPr rtlCol="0" anchor="ctr"/>
+          <a:lstStyle/>
+          <a:p>
+            <a:pPr algn="ctr"/>
+            <a:endParaRPr lang="en-US"/>
+          </a:p>
+        </p:txBody>
+      </p:sp>
+      <p:grpSp>
+        <p:nvGrpSpPr>
+          <p:cNvPr id="1031" name="Group 140">
+            <a:extLst>
+              <a:ext uri="{FF2B5EF4-FFF2-40B4-BE49-F238E27FC236}">
+                <a16:creationId xmlns:a16="http://schemas.microsoft.com/office/drawing/2014/main" id="{85981F80-69EE-4E2B-82A8-47FDFD7720AC}"/>
+              </a:ext>
+              <a:ext uri="{C183D7F6-B498-43B3-948B-1728B52AA6E4}">
+                <adec:decorative xmlns:adec="http://schemas.microsoft.com/office/drawing/2017/decorative" val="1"/>
+              </a:ext>
+            </a:extLst>
+          </p:cNvPr>
+          <p:cNvGrpSpPr>
+            <a:grpSpLocks noGrp="1" noUngrp="1" noRot="1" noChangeAspect="1" noMove="1" noResize="1"/>
+          </p:cNvGrpSpPr>
+          <p:nvPr>
+            <p:extLst>
+              <p:ext uri="{386F3935-93C4-4BCD-93E2-E3B085C9AB24}">
+                <p16:designElem xmlns:p16="http://schemas.microsoft.com/office/powerpoint/2015/main" val="1"/>
+              </p:ext>
+            </p:extLst>
+          </p:nvPr>
+        </p:nvGrpSpPr>
+        <p:grpSpPr>
+          <a:xfrm>
+            <a:off x="9649215" y="4068923"/>
+            <a:ext cx="1080904" cy="1080902"/>
+            <a:chOff x="9685338" y="4460675"/>
+            <a:chExt cx="1080904" cy="1080902"/>
+          </a:xfrm>
+        </p:grpSpPr>
+        <p:sp>
+          <p:nvSpPr>
+            <p:cNvPr id="142" name="Oval 141">
+              <a:extLst>
+                <a:ext uri="{FF2B5EF4-FFF2-40B4-BE49-F238E27FC236}">
+                  <a16:creationId xmlns:a16="http://schemas.microsoft.com/office/drawing/2014/main" id="{46CE0473-0B07-47EE-A016-EBD87F2C8C9C}"/>
+                </a:ext>
+                <a:ext uri="{C183D7F6-B498-43B3-948B-1728B52AA6E4}">
+                  <adec:decorative xmlns:adec="http://schemas.microsoft.com/office/drawing/2017/decorative" val="1"/>
+                </a:ext>
+              </a:extLst>
+            </p:cNvPr>
+            <p:cNvSpPr/>
+            <p:nvPr>
+              <p:extLst>
+                <p:ext uri="{386F3935-93C4-4BCD-93E2-E3B085C9AB24}">
+                  <p16:designElem xmlns:p16="http://schemas.microsoft.com/office/powerpoint/2015/main" val="1"/>
+                </p:ext>
+              </p:extLst>
+            </p:nvPr>
+          </p:nvSpPr>
+          <p:spPr>
+            <a:xfrm>
+              <a:off x="9685338" y="4460675"/>
+              <a:ext cx="1080904" cy="1080902"/>
+            </a:xfrm>
+            <a:prstGeom prst="ellipse">
+              <a:avLst/>
+            </a:prstGeom>
+            <a:blipFill dpi="0" rotWithShape="1">
+              <a:blip r:embed="rId5">
+                <a:duotone>
+                  <a:schemeClr val="accent1">
+                    <a:shade val="45000"/>
+                    <a:satMod val="135000"/>
+                  </a:schemeClr>
+                  <a:prstClr val="white"/>
+                </a:duotone>
+                <a:extLst>
+                  <a:ext uri="{BEBA8EAE-BF5A-486C-A8C5-ECC9F3942E4B}">
+                    <a14:imgProps xmlns:a14="http://schemas.microsoft.com/office/drawing/2010/main">
+                      <a14:imgLayer r:embed="rId6">
+                        <a14:imgEffect>
+                          <a14:saturation sat="95000"/>
+                        </a14:imgEffect>
+                      </a14:imgLayer>
+                    </a14:imgProps>
+                  </a:ext>
+                </a:extLst>
+              </a:blip>
+              <a:srcRect/>
+              <a:tile tx="0" ty="0" sx="85000" sy="85000" flip="none" algn="tl"/>
+            </a:blipFill>
+            <a:ln w="25400" cap="flat" cmpd="sng" algn="ctr">
+              <a:noFill/>
+              <a:prstDash val="solid"/>
+            </a:ln>
+            <a:effectLst/>
+          </p:spPr>
+          <p:txBody>
+            <a:bodyPr lIns="0" tIns="0" rIns="0" bIns="0" rtlCol="0" anchor="ctr"/>
+            <a:lstStyle/>
+            <a:p>
+              <a:pPr marL="0" marR="0" lvl="0" indent="0" algn="ctr" defTabSz="914400" eaLnBrk="1" fontAlgn="auto" latinLnBrk="0" hangingPunct="1">
+                <a:lnSpc>
+                  <a:spcPct val="100000"/>
+                </a:lnSpc>
+                <a:spcBef>
+                  <a:spcPts val="0"/>
+                </a:spcBef>
+                <a:spcAft>
+                  <a:spcPts val="0"/>
+                </a:spcAft>
+                <a:buClrTx/>
+                <a:buSzTx/>
+                <a:buFontTx/>
+                <a:buNone/>
+                <a:tabLst/>
+                <a:defRPr/>
+              </a:pPr>
+              <a:endParaRPr kumimoji="0" lang="en-US" sz="2000" b="0" i="0" u="none" strike="noStrike" kern="0" cap="none" spc="0" normalizeH="0" baseline="0" noProof="0" dirty="0">
+                <a:ln>
+                  <a:noFill/>
+                </a:ln>
+                <a:solidFill>
+                  <a:prstClr val="white"/>
+                </a:solidFill>
+                <a:effectLst/>
+                <a:uLnTx/>
+                <a:uFillTx/>
+                <a:latin typeface="Rockwell Extra Bold" pitchFamily="18" charset="0"/>
+                <a:ea typeface="+mn-ea"/>
+                <a:cs typeface="+mn-cs"/>
+              </a:endParaRPr>
+            </a:p>
+          </p:txBody>
+        </p:sp>
+        <p:sp>
+          <p:nvSpPr>
+            <p:cNvPr id="143" name="Oval 142">
+              <a:extLst>
+                <a:ext uri="{FF2B5EF4-FFF2-40B4-BE49-F238E27FC236}">
+                  <a16:creationId xmlns:a16="http://schemas.microsoft.com/office/drawing/2014/main" id="{EDD0D1E4-DFCA-4DF0-9D37-571A5F529F0A}"/>
+                </a:ext>
+                <a:ext uri="{C183D7F6-B498-43B3-948B-1728B52AA6E4}">
+                  <adec:decorative xmlns:adec="http://schemas.microsoft.com/office/drawing/2017/decorative" val="1"/>
+                </a:ext>
+              </a:extLst>
+            </p:cNvPr>
+            <p:cNvSpPr/>
+            <p:nvPr>
+              <p:extLst>
+                <p:ext uri="{386F3935-93C4-4BCD-93E2-E3B085C9AB24}">
+                  <p16:designElem xmlns:p16="http://schemas.microsoft.com/office/powerpoint/2015/main" val="1"/>
+                </p:ext>
+              </p:extLst>
+            </p:nvPr>
+          </p:nvSpPr>
+          <p:spPr>
+            <a:xfrm>
+              <a:off x="9793429" y="4568765"/>
+              <a:ext cx="864723" cy="864722"/>
+            </a:xfrm>
+            <a:prstGeom prst="ellipse">
+              <a:avLst/>
+            </a:prstGeom>
+            <a:noFill/>
+            <a:ln w="25400" cap="flat" cmpd="sng" algn="ctr">
+              <a:solidFill>
+                <a:sysClr val="window" lastClr="FFFFFF"/>
+              </a:solidFill>
+              <a:prstDash val="solid"/>
+            </a:ln>
+            <a:effectLst/>
+          </p:spPr>
+          <p:txBody>
+            <a:bodyPr rtlCol="0" anchor="ctr"/>
+            <a:lstStyle/>
+            <a:p>
+              <a:pPr marL="0" marR="0" lvl="0" indent="0" algn="ctr" defTabSz="914400" eaLnBrk="1" fontAlgn="auto" latinLnBrk="0" hangingPunct="1">
+                <a:lnSpc>
+                  <a:spcPct val="100000"/>
+                </a:lnSpc>
+                <a:spcBef>
+                  <a:spcPts val="0"/>
+                </a:spcBef>
+                <a:spcAft>
+                  <a:spcPts val="0"/>
+                </a:spcAft>
+                <a:buClrTx/>
+                <a:buSzTx/>
+                <a:buFontTx/>
+                <a:buNone/>
+                <a:tabLst/>
+                <a:defRPr/>
+              </a:pPr>
+              <a:endParaRPr kumimoji="0" lang="en-US" sz="1800" b="0" i="0" u="none" strike="noStrike" kern="0" cap="none" spc="0" normalizeH="0" baseline="0" noProof="0" dirty="0">
+                <a:ln>
+                  <a:noFill/>
+                </a:ln>
+                <a:solidFill>
+                  <a:prstClr val="white"/>
+                </a:solidFill>
+                <a:effectLst/>
+                <a:uLnTx/>
+                <a:uFillTx/>
+                <a:latin typeface="Calibri"/>
+                <a:ea typeface="+mn-ea"/>
+                <a:cs typeface="+mn-cs"/>
+              </a:endParaRPr>
+            </a:p>
+          </p:txBody>
+        </p:sp>
+      </p:grpSp>
+      <p:sp useBgFill="1">
+        <p:nvSpPr>
+          <p:cNvPr id="1032" name="Rectangle 144">
+            <a:extLst>
+              <a:ext uri="{FF2B5EF4-FFF2-40B4-BE49-F238E27FC236}">
+                <a16:creationId xmlns:a16="http://schemas.microsoft.com/office/drawing/2014/main" id="{2A0E4E09-FC02-4ADC-951A-3FFA90B6FE39}"/>
+              </a:ext>
+              <a:ext uri="{C183D7F6-B498-43B3-948B-1728B52AA6E4}">
+                <adec:decorative xmlns:adec="http://schemas.microsoft.com/office/drawing/2017/decorative" val="1"/>
+              </a:ext>
+            </a:extLst>
+          </p:cNvPr>
+          <p:cNvSpPr>
+            <a:spLocks noGrp="1" noRot="1" noChangeAspect="1" noMove="1" noResize="1" noEditPoints="1" noAdjustHandles="1" noChangeArrowheads="1" noChangeShapeType="1" noTextEdit="1"/>
+          </p:cNvSpPr>
+          <p:nvPr>
+            <p:extLst>
+              <p:ext uri="{386F3935-93C4-4BCD-93E2-E3B085C9AB24}">
+                <p16:designElem xmlns:p16="http://schemas.microsoft.com/office/powerpoint/2015/main" val="1"/>
+              </p:ext>
+            </p:extLst>
+          </p:nvPr>
+        </p:nvSpPr>
+        <p:spPr>
+          <a:xfrm>
+            <a:off x="0" y="0"/>
+            <a:ext cx="12191695" cy="6858000"/>
+          </a:xfrm>
+          <a:prstGeom prst="rect">
+            <a:avLst/>
+          </a:prstGeom>
+          <a:ln>
+            <a:noFill/>
+          </a:ln>
+        </p:spPr>
+        <p:style>
+          <a:lnRef idx="2">
+            <a:schemeClr val="accent1">
+              <a:shade val="50000"/>
+            </a:schemeClr>
+          </a:lnRef>
+          <a:fillRef idx="1">
+            <a:schemeClr val="accent1"/>
+          </a:fillRef>
+          <a:effectRef idx="0">
+            <a:schemeClr val="accent1"/>
+          </a:effectRef>
+          <a:fontRef idx="minor">
+            <a:schemeClr val="lt1"/>
+          </a:fontRef>
+        </p:style>
+        <p:txBody>
+          <a:bodyPr rtlCol="0" anchor="ctr"/>
+          <a:lstStyle/>
+          <a:p>
+            <a:pPr algn="ctr"/>
+            <a:endParaRPr lang="en-US"/>
+          </a:p>
+        </p:txBody>
+      </p:sp>
+      <p:sp>
+        <p:nvSpPr>
+          <p:cNvPr id="1033" name="Freeform: Shape 146">
+            <a:extLst>
+              <a:ext uri="{FF2B5EF4-FFF2-40B4-BE49-F238E27FC236}">
+                <a16:creationId xmlns:a16="http://schemas.microsoft.com/office/drawing/2014/main" id="{14A1598B-1957-47CF-AAF4-F7A36DA0E7CB}"/>
+              </a:ext>
+              <a:ext uri="{C183D7F6-B498-43B3-948B-1728B52AA6E4}">
+                <adec:decorative xmlns:adec="http://schemas.microsoft.com/office/drawing/2017/decorative" val="1"/>
+              </a:ext>
+            </a:extLst>
+          </p:cNvPr>
+          <p:cNvSpPr>
+            <a:spLocks noGrp="1" noRot="1" noChangeAspect="1" noMove="1" noResize="1" noEditPoints="1" noAdjustHandles="1" noChangeArrowheads="1" noChangeShapeType="1" noTextEdit="1"/>
+          </p:cNvSpPr>
+          <p:nvPr>
+            <p:extLst>
+              <p:ext uri="{386F3935-93C4-4BCD-93E2-E3B085C9AB24}">
+                <p16:designElem xmlns:p16="http://schemas.microsoft.com/office/powerpoint/2015/main" val="1"/>
+              </p:ext>
+            </p:extLst>
+          </p:nvPr>
+        </p:nvSpPr>
+        <p:spPr>
+          <a:xfrm>
+            <a:off x="2" y="3"/>
+            <a:ext cx="6095695" cy="6857997"/>
+          </a:xfrm>
+          <a:custGeom>
+            <a:avLst/>
+            <a:gdLst>
+              <a:gd name="connsiteX0" fmla="*/ 3435036 w 6095695"/>
+              <a:gd name="connsiteY0" fmla="*/ 0 h 6857997"/>
+              <a:gd name="connsiteX1" fmla="*/ 4198562 w 6095695"/>
+              <a:gd name="connsiteY1" fmla="*/ 0 h 6857997"/>
+              <a:gd name="connsiteX2" fmla="*/ 4365987 w 6095695"/>
+              <a:gd name="connsiteY2" fmla="*/ 128761 h 6857997"/>
+              <a:gd name="connsiteX3" fmla="*/ 6095695 w 6095695"/>
+              <a:gd name="connsiteY3" fmla="*/ 3718209 h 6857997"/>
+              <a:gd name="connsiteX4" fmla="*/ 4860911 w 6095695"/>
+              <a:gd name="connsiteY4" fmla="*/ 6845880 h 6857997"/>
+              <a:gd name="connsiteX5" fmla="*/ 4849107 w 6095695"/>
+              <a:gd name="connsiteY5" fmla="*/ 6857997 h 6857997"/>
+              <a:gd name="connsiteX6" fmla="*/ 4253869 w 6095695"/>
+              <a:gd name="connsiteY6" fmla="*/ 6857997 h 6857997"/>
+              <a:gd name="connsiteX7" fmla="*/ 4409441 w 6095695"/>
+              <a:gd name="connsiteY7" fmla="*/ 6719623 h 6857997"/>
+              <a:gd name="connsiteX8" fmla="*/ 5679794 w 6095695"/>
+              <a:gd name="connsiteY8" fmla="*/ 3718209 h 6857997"/>
+              <a:gd name="connsiteX9" fmla="*/ 3591563 w 6095695"/>
+              <a:gd name="connsiteY9" fmla="*/ 88079 h 6857997"/>
+              <a:gd name="connsiteX10" fmla="*/ 0 w 6095695"/>
+              <a:gd name="connsiteY10" fmla="*/ 0 h 6857997"/>
+              <a:gd name="connsiteX11" fmla="*/ 3177466 w 6095695"/>
+              <a:gd name="connsiteY11" fmla="*/ 0 h 6857997"/>
+              <a:gd name="connsiteX12" fmla="*/ 3353291 w 6095695"/>
+              <a:gd name="connsiteY12" fmla="*/ 88129 h 6857997"/>
+              <a:gd name="connsiteX13" fmla="*/ 5560965 w 6095695"/>
+              <a:gd name="connsiteY13" fmla="*/ 3718209 h 6857997"/>
+              <a:gd name="connsiteX14" fmla="*/ 4325417 w 6095695"/>
+              <a:gd name="connsiteY14" fmla="*/ 6637392 h 6857997"/>
+              <a:gd name="connsiteX15" fmla="*/ 4077394 w 6095695"/>
+              <a:gd name="connsiteY15" fmla="*/ 6857997 h 6857997"/>
+              <a:gd name="connsiteX16" fmla="*/ 0 w 6095695"/>
+              <a:gd name="connsiteY16" fmla="*/ 6857997 h 6857997"/>
+            </a:gdLst>
+            <a:ahLst/>
+            <a:cxnLst>
+              <a:cxn ang="0">
+                <a:pos x="connsiteX0" y="connsiteY0"/>
+              </a:cxn>
+              <a:cxn ang="0">
+                <a:pos x="connsiteX1" y="connsiteY1"/>
+              </a:cxn>
+              <a:cxn ang="0">
+                <a:pos x="connsiteX2" y="connsiteY2"/>
+              </a:cxn>
+              <a:cxn ang="0">
+                <a:pos x="connsiteX3" y="connsiteY3"/>
+              </a:cxn>
+              <a:cxn ang="0">
+                <a:pos x="connsiteX4" y="connsiteY4"/>
+              </a:cxn>
+              <a:cxn ang="0">
+                <a:pos x="connsiteX5" y="connsiteY5"/>
+              </a:cxn>
+              <a:cxn ang="0">
+                <a:pos x="connsiteX6" y="connsiteY6"/>
+              </a:cxn>
+              <a:cxn ang="0">
+                <a:pos x="connsiteX7" y="connsiteY7"/>
+              </a:cxn>
+              <a:cxn ang="0">
+                <a:pos x="connsiteX8" y="connsiteY8"/>
+              </a:cxn>
+              <a:cxn ang="0">
+                <a:pos x="connsiteX9" y="connsiteY9"/>
+              </a:cxn>
+              <a:cxn ang="0">
+                <a:pos x="connsiteX10" y="connsiteY10"/>
+              </a:cxn>
+              <a:cxn ang="0">
+                <a:pos x="connsiteX11" y="connsiteY11"/>
+              </a:cxn>
+              <a:cxn ang="0">
+                <a:pos x="connsiteX12" y="connsiteY12"/>
+              </a:cxn>
+              <a:cxn ang="0">
+                <a:pos x="connsiteX13" y="connsiteY13"/>
+              </a:cxn>
+              <a:cxn ang="0">
+                <a:pos x="connsiteX14" y="connsiteY14"/>
+              </a:cxn>
+              <a:cxn ang="0">
+                <a:pos x="connsiteX15" y="connsiteY15"/>
+              </a:cxn>
+              <a:cxn ang="0">
+                <a:pos x="connsiteX16" y="connsiteY16"/>
+              </a:cxn>
+            </a:cxnLst>
+            <a:rect l="l" t="t" r="r" b="b"/>
+            <a:pathLst>
+              <a:path w="6095695" h="6857997">
+                <a:moveTo>
+                  <a:pt x="3435036" y="0"/>
+                </a:moveTo>
+                <a:lnTo>
+                  <a:pt x="4198562" y="0"/>
+                </a:lnTo>
+                <a:lnTo>
+                  <a:pt x="4365987" y="128761"/>
+                </a:lnTo>
+                <a:cubicBezTo>
+                  <a:pt x="5422363" y="981944"/>
+                  <a:pt x="6095695" y="2273123"/>
+                  <a:pt x="6095695" y="3718209"/>
+                </a:cubicBezTo>
+                <a:cubicBezTo>
+                  <a:pt x="6095695" y="4922447"/>
+                  <a:pt x="5628104" y="6019805"/>
+                  <a:pt x="4860911" y="6845880"/>
+                </a:cubicBezTo>
+                <a:lnTo>
+                  <a:pt x="4849107" y="6857997"/>
+                </a:lnTo>
+                <a:lnTo>
+                  <a:pt x="4253869" y="6857997"/>
+                </a:lnTo>
+                <a:lnTo>
+                  <a:pt x="4409441" y="6719623"/>
+                </a:lnTo>
+                <a:cubicBezTo>
+                  <a:pt x="5194330" y="5951494"/>
+                  <a:pt x="5679794" y="4890334"/>
+                  <a:pt x="5679794" y="3718209"/>
+                </a:cubicBezTo>
+                <a:cubicBezTo>
+                  <a:pt x="5679794" y="2179795"/>
+                  <a:pt x="4843506" y="832535"/>
+                  <a:pt x="3591563" y="88079"/>
+                </a:cubicBezTo>
+                <a:close/>
+                <a:moveTo>
+                  <a:pt x="0" y="0"/>
+                </a:moveTo>
+                <a:lnTo>
+                  <a:pt x="3177466" y="0"/>
+                </a:lnTo>
+                <a:lnTo>
+                  <a:pt x="3353291" y="88129"/>
+                </a:lnTo>
+                <a:cubicBezTo>
+                  <a:pt x="4668281" y="787221"/>
+                  <a:pt x="5560965" y="2150692"/>
+                  <a:pt x="5560965" y="3718209"/>
+                </a:cubicBezTo>
+                <a:cubicBezTo>
+                  <a:pt x="5560965" y="4858221"/>
+                  <a:pt x="5088802" y="5890308"/>
+                  <a:pt x="4325417" y="6637392"/>
+                </a:cubicBezTo>
+                <a:lnTo>
+                  <a:pt x="4077394" y="6857997"/>
+                </a:lnTo>
+                <a:lnTo>
+                  <a:pt x="0" y="6857997"/>
+                </a:lnTo>
+                <a:close/>
+              </a:path>
+            </a:pathLst>
+          </a:custGeom>
+          <a:solidFill>
+            <a:schemeClr val="tx1"/>
+          </a:solidFill>
+          <a:ln>
+            <a:noFill/>
+          </a:ln>
+        </p:spPr>
+        <p:style>
+          <a:lnRef idx="2">
+            <a:schemeClr val="accent1">
+              <a:shade val="50000"/>
+            </a:schemeClr>
+          </a:lnRef>
+          <a:fillRef idx="1">
+            <a:schemeClr val="accent1"/>
+          </a:fillRef>
+          <a:effectRef idx="0">
+            <a:schemeClr val="accent1"/>
+          </a:effectRef>
+          <a:fontRef idx="minor">
+            <a:schemeClr val="lt1"/>
+          </a:fontRef>
+        </p:style>
+        <p:txBody>
+          <a:bodyPr wrap="square" rtlCol="0" anchor="ctr">
+            <a:noAutofit/>
+          </a:bodyPr>
+          <a:lstStyle/>
+          <a:p>
+            <a:pPr algn="ctr"/>
+            <a:endParaRPr lang="en-US"/>
+          </a:p>
+        </p:txBody>
+      </p:sp>
+      <p:pic>
+        <p:nvPicPr>
+          <p:cNvPr id="1026" name="Picture 2" descr="turing machine gifs ile ilgili gÃ¶rsel sonucu">
+            <a:extLst>
+              <a:ext uri="{FF2B5EF4-FFF2-40B4-BE49-F238E27FC236}">
+                <a16:creationId xmlns:a16="http://schemas.microsoft.com/office/drawing/2014/main" id="{BF0F9407-65F3-4A38-B1F5-DC2952B419AB}"/>
+              </a:ext>
+            </a:extLst>
+          </p:cNvPr>
+          <p:cNvPicPr>
+            <a:picLocks noChangeAspect="1" noChangeArrowheads="1" noCrop="1"/>
+          </p:cNvPicPr>
+          <p:nvPr/>
+        </p:nvPicPr>
+        <p:blipFill>
+          <a:blip r:embed="rId7">
+            <a:extLst>
+              <a:ext uri="{28A0092B-C50C-407E-A947-70E740481C1C}">
+                <a14:useLocalDpi xmlns:a14="http://schemas.microsoft.com/office/drawing/2010/main" val="0"/>
+              </a:ext>
+            </a:extLst>
+          </a:blip>
+          <a:stretch>
+            <a:fillRect/>
+          </a:stretch>
+        </p:blipFill>
+        <p:spPr bwMode="auto">
+          <a:xfrm>
+            <a:off x="6260827" y="2135873"/>
+            <a:ext cx="5765738" cy="2473501"/>
+          </a:xfrm>
+          <a:prstGeom prst="rect">
+            <a:avLst/>
+          </a:prstGeom>
+          <a:noFill/>
+          <a:extLst>
+            <a:ext uri="{909E8E84-426E-40DD-AFC4-6F175D3DCCD1}">
+              <a14:hiddenFill xmlns:a14="http://schemas.microsoft.com/office/drawing/2010/main">
+                <a:solidFill>
+                  <a:srgbClr val="FFFFFF"/>
+                </a:solidFill>
+              </a14:hiddenFill>
+            </a:ext>
+          </a:extLst>
+        </p:spPr>
+      </p:pic>
+      <p:sp>
+        <p:nvSpPr>
+          <p:cNvPr id="2" name="Unvan 1">
+            <a:extLst>
+              <a:ext uri="{FF2B5EF4-FFF2-40B4-BE49-F238E27FC236}">
+                <a16:creationId xmlns:a16="http://schemas.microsoft.com/office/drawing/2014/main" id="{E5368EF8-C66D-4164-A89C-5891E86CCC81}"/>
+              </a:ext>
+            </a:extLst>
+          </p:cNvPr>
+          <p:cNvSpPr>
+            <a:spLocks noGrp="1"/>
+          </p:cNvSpPr>
+          <p:nvPr>
+            <p:ph type="title"/>
+          </p:nvPr>
+        </p:nvSpPr>
+        <p:spPr>
+          <a:xfrm>
+            <a:off x="2055600" y="2757724"/>
+            <a:ext cx="2506775" cy="1199857"/>
+          </a:xfrm>
+        </p:spPr>
+        <p:txBody>
+          <a:bodyPr vert="horz" lIns="91440" tIns="45720" rIns="91440" bIns="45720" rtlCol="0" anchor="b">
+            <a:normAutofit fontScale="90000"/>
+          </a:bodyPr>
+          <a:lstStyle/>
+          <a:p>
+            <a:pPr>
+              <a:lnSpc>
+                <a:spcPct val="80000"/>
+              </a:lnSpc>
+            </a:pPr>
+            <a:r>
+              <a:rPr lang="en-US" sz="7200" dirty="0">
+                <a:solidFill>
+                  <a:schemeClr val="bg1"/>
+                </a:solidFill>
+              </a:rPr>
+              <a:t>demo</a:t>
+            </a:r>
+            <a:r>
+              <a:rPr lang="tr-TR" sz="7200" dirty="0">
+                <a:solidFill>
+                  <a:srgbClr val="FFC000"/>
+                </a:solidFill>
+              </a:rPr>
+              <a:t>[4]</a:t>
+            </a:r>
+            <a:endParaRPr lang="en-US" sz="7200" dirty="0">
+              <a:solidFill>
+                <a:srgbClr val="FFC000"/>
+              </a:solidFill>
+            </a:endParaRPr>
+          </a:p>
+        </p:txBody>
+      </p:sp>
+      <p:pic>
+        <p:nvPicPr>
+          <p:cNvPr id="7" name="Picture 8" descr="github icon ile ilgili gÃ¶rsel sonucu">
+            <a:hlinkClick r:id="rId8"/>
+            <a:extLst>
+              <a:ext uri="{FF2B5EF4-FFF2-40B4-BE49-F238E27FC236}">
+                <a16:creationId xmlns:a16="http://schemas.microsoft.com/office/drawing/2014/main" id="{484B65B2-1EFF-4937-AA09-1584C422F339}"/>
+              </a:ext>
+            </a:extLst>
+          </p:cNvPr>
+          <p:cNvPicPr>
+            <a:picLocks noChangeAspect="1" noChangeArrowheads="1"/>
+          </p:cNvPicPr>
+          <p:nvPr/>
+        </p:nvPicPr>
+        <p:blipFill>
+          <a:blip r:embed="rId9">
+            <a:extLst>
+              <a:ext uri="{28A0092B-C50C-407E-A947-70E740481C1C}">
+                <a14:useLocalDpi xmlns:a14="http://schemas.microsoft.com/office/drawing/2010/main" val="0"/>
+              </a:ext>
+            </a:extLst>
+          </a:blip>
+          <a:srcRect/>
+          <a:stretch>
+            <a:fillRect/>
+          </a:stretch>
+        </p:blipFill>
+        <p:spPr bwMode="auto">
+          <a:xfrm>
+            <a:off x="639960" y="2790506"/>
+            <a:ext cx="1219200" cy="1219200"/>
+          </a:xfrm>
+          <a:prstGeom prst="rect">
+            <a:avLst/>
+          </a:prstGeom>
+          <a:noFill/>
+          <a:extLst>
+            <a:ext uri="{909E8E84-426E-40DD-AFC4-6F175D3DCCD1}">
+              <a14:hiddenFill xmlns:a14="http://schemas.microsoft.com/office/drawing/2010/main">
+                <a:solidFill>
+                  <a:srgbClr val="FFFFFF"/>
+                </a:solidFill>
+              </a14:hiddenFill>
+            </a:ext>
+          </a:extLst>
+        </p:spPr>
+      </p:pic>
+    </p:spTree>
+    <p:extLst>
+      <p:ext uri="{BB962C8B-B14F-4D97-AF65-F5344CB8AC3E}">
+        <p14:creationId xmlns:p14="http://schemas.microsoft.com/office/powerpoint/2010/main" val="2536100901"/>
+      </p:ext>
+    </p:extLst>
+  </p:cSld>
+  <p:clrMapOvr>
+    <a:overrideClrMapping bg1="dk1" tx1="lt1" bg2="dk2" tx2="lt2" accent1="accent1" accent2="accent2" accent3="accent3" accent4="accent4" accent5="accent5" accent6="accent6" hlink="hlink" folHlink="folHlink"/>
+  </p:clrMapOvr>
+</p:sld>
+</file>
+
+<file path=ppt/slides/slide12.xml><?xml version="1.0" encoding="utf-8"?>
+<p:sld xmlns:a="http://schemas.openxmlformats.org/drawingml/2006/main" xmlns:r="http://schemas.openxmlformats.org/officeDocument/2006/relationships" xmlns:p="http://schemas.openxmlformats.org/presentationml/2006/main">
+  <p:cSld>
     <p:spTree>
       <p:nvGrpSpPr>
         <p:cNvPr id="1" name=""/>
@@ -5066,6 +6006,19 @@
                 <a:hlinkClick r:id="rId3"/>
               </a:rPr>
               <a:t>com_content</a:t>
+            </a:r>
+            <a:endParaRPr lang="tr-TR" dirty="0"/>
+          </a:p>
+          <a:p>
+            <a:r>
+              <a:rPr lang="tr-TR" dirty="0"/>
+              <a:t>[4] </a:t>
+            </a:r>
+            <a:r>
+              <a:rPr lang="tr-TR" dirty="0">
+                <a:hlinkClick r:id="rId4"/>
+              </a:rPr>
+              <a:t>https://github.com/sevvalmehder/Tur2Spell</a:t>
             </a:r>
             <a:endParaRPr lang="tr-TR" dirty="0"/>
           </a:p>

</xml_diff>